<commit_message>
add missing slides to intro template
</commit_message>
<xml_diff>
--- a/docs/intro_slides_template.pptx
+++ b/docs/intro_slides_template.pptx
@@ -5,7 +5,14 @@
     <p:sldMasterId id="2147483660" r:id="rId1"/>
   </p:sldMasterIdLst>
   <p:sldIdLst>
-    <p:sldId id="257" r:id="rId2"/>
+    <p:sldId id="259" r:id="rId2"/>
+    <p:sldId id="257" r:id="rId3"/>
+    <p:sldId id="258" r:id="rId4"/>
+    <p:sldId id="260" r:id="rId5"/>
+    <p:sldId id="261" r:id="rId6"/>
+    <p:sldId id="262" r:id="rId7"/>
+    <p:sldId id="263" r:id="rId8"/>
+    <p:sldId id="264" r:id="rId9"/>
   </p:sldIdLst>
   <p:sldSz cx="12192000" cy="6858000"/>
   <p:notesSz cx="6858000" cy="9144000"/>
@@ -4964,6 +4971,106 @@
       </p:grpSpPr>
       <p:sp>
         <p:nvSpPr>
+          <p:cNvPr id="3" name="Title 2">
+            <a:extLst>
+              <a:ext uri="{FF2B5EF4-FFF2-40B4-BE49-F238E27FC236}">
+                <a16:creationId xmlns:a16="http://schemas.microsoft.com/office/drawing/2014/main" id="{A77D5736-22D1-4B85-2002-9259D507D4C1}"/>
+              </a:ext>
+            </a:extLst>
+          </p:cNvPr>
+          <p:cNvSpPr>
+            <a:spLocks noGrp="1"/>
+          </p:cNvSpPr>
+          <p:nvPr>
+            <p:ph type="title"/>
+          </p:nvPr>
+        </p:nvSpPr>
+        <p:spPr/>
+        <p:txBody>
+          <a:bodyPr/>
+          <a:lstStyle/>
+          <a:p>
+            <a:r>
+              <a:rPr lang="en-US" dirty="0"/>
+              <a:t>Fun thing</a:t>
+            </a:r>
+            <a:endParaRPr lang="en-BE" dirty="0"/>
+          </a:p>
+        </p:txBody>
+      </p:sp>
+      <p:sp>
+        <p:nvSpPr>
+          <p:cNvPr id="4" name="Content Placeholder 3">
+            <a:extLst>
+              <a:ext uri="{FF2B5EF4-FFF2-40B4-BE49-F238E27FC236}">
+                <a16:creationId xmlns:a16="http://schemas.microsoft.com/office/drawing/2014/main" id="{2DAAC566-C0B4-1A68-6C83-CB0593FF044F}"/>
+              </a:ext>
+            </a:extLst>
+          </p:cNvPr>
+          <p:cNvSpPr>
+            <a:spLocks noGrp="1"/>
+          </p:cNvSpPr>
+          <p:nvPr>
+            <p:ph idx="1"/>
+          </p:nvPr>
+        </p:nvSpPr>
+        <p:spPr/>
+        <p:txBody>
+          <a:bodyPr/>
+          <a:lstStyle/>
+          <a:p>
+            <a:r>
+              <a:rPr lang="en-US" dirty="0"/>
+              <a:t>I tend to do something fun and not </a:t>
+            </a:r>
+            <a:r>
+              <a:rPr lang="en-US" dirty="0" err="1"/>
+              <a:t>opo</a:t>
+            </a:r>
+            <a:r>
+              <a:rPr lang="en-US" dirty="0"/>
+              <a:t> relevant in the first five minutes. It makes sure that people being a bit late don’t miss the start, and hopefully they’re interesting enough people really want to be on time. It also puts something exciting on </a:t>
+            </a:r>
+            <a:r>
+              <a:rPr lang="en-US"/>
+              <a:t>the beamer.</a:t>
+            </a:r>
+            <a:endParaRPr lang="en-BE" dirty="0"/>
+          </a:p>
+        </p:txBody>
+      </p:sp>
+    </p:spTree>
+    <p:extLst>
+      <p:ext uri="{BB962C8B-B14F-4D97-AF65-F5344CB8AC3E}">
+        <p14:creationId xmlns:p14="http://schemas.microsoft.com/office/powerpoint/2010/main" val="1984375173"/>
+      </p:ext>
+    </p:extLst>
+  </p:cSld>
+  <p:clrMapOvr>
+    <a:masterClrMapping/>
+  </p:clrMapOvr>
+</p:sld>
+</file>
+
+<file path=ppt/slides/slide2.xml><?xml version="1.0" encoding="utf-8"?>
+<p:sld xmlns:a="http://schemas.openxmlformats.org/drawingml/2006/main" xmlns:r="http://schemas.openxmlformats.org/officeDocument/2006/relationships" xmlns:p="http://schemas.openxmlformats.org/presentationml/2006/main">
+  <p:cSld>
+    <p:spTree>
+      <p:nvGrpSpPr>
+        <p:cNvPr id="1" name=""/>
+        <p:cNvGrpSpPr/>
+        <p:nvPr/>
+      </p:nvGrpSpPr>
+      <p:grpSpPr>
+        <a:xfrm>
+          <a:off x="0" y="0"/>
+          <a:ext cx="0" cy="0"/>
+          <a:chOff x="0" y="0"/>
+          <a:chExt cx="0" cy="0"/>
+        </a:xfrm>
+      </p:grpSpPr>
+      <p:sp>
+        <p:nvSpPr>
           <p:cNvPr id="2" name="Text Placeholder 1">
             <a:extLst>
               <a:ext uri="{FF2B5EF4-FFF2-40B4-BE49-F238E27FC236}">
@@ -5021,15 +5128,7 @@
           <a:p>
             <a:r>
               <a:rPr lang="en-US" dirty="0"/>
-              <a:t>Week X : </a:t>
-            </a:r>
-            <a:r>
-              <a:rPr lang="en-US" dirty="0" err="1"/>
-              <a:t>Titel</a:t>
-            </a:r>
-            <a:r>
-              <a:rPr lang="en-US" dirty="0"/>
-              <a:t> week</a:t>
+              <a:t>Week X : Title week</a:t>
             </a:r>
             <a:endParaRPr lang="en-BE" dirty="0"/>
           </a:p>
@@ -5126,6 +5225,583 @@
     <p:extLst>
       <p:ext uri="{BB962C8B-B14F-4D97-AF65-F5344CB8AC3E}">
         <p14:creationId xmlns:p14="http://schemas.microsoft.com/office/powerpoint/2010/main" val="1702154029"/>
+      </p:ext>
+    </p:extLst>
+  </p:cSld>
+  <p:clrMapOvr>
+    <a:masterClrMapping/>
+  </p:clrMapOvr>
+</p:sld>
+</file>
+
+<file path=ppt/slides/slide3.xml><?xml version="1.0" encoding="utf-8"?>
+<p:sld xmlns:a="http://schemas.openxmlformats.org/drawingml/2006/main" xmlns:r="http://schemas.openxmlformats.org/officeDocument/2006/relationships" xmlns:p="http://schemas.openxmlformats.org/presentationml/2006/main">
+  <p:cSld>
+    <p:spTree>
+      <p:nvGrpSpPr>
+        <p:cNvPr id="1" name=""/>
+        <p:cNvGrpSpPr/>
+        <p:nvPr/>
+      </p:nvGrpSpPr>
+      <p:grpSpPr>
+        <a:xfrm>
+          <a:off x="0" y="0"/>
+          <a:ext cx="0" cy="0"/>
+          <a:chOff x="0" y="0"/>
+          <a:chExt cx="0" cy="0"/>
+        </a:xfrm>
+      </p:grpSpPr>
+      <p:sp>
+        <p:nvSpPr>
+          <p:cNvPr id="2" name="Title 1">
+            <a:extLst>
+              <a:ext uri="{FF2B5EF4-FFF2-40B4-BE49-F238E27FC236}">
+                <a16:creationId xmlns:a16="http://schemas.microsoft.com/office/drawing/2014/main" id="{DF8021E9-4340-0482-BEF5-A50E058B5788}"/>
+              </a:ext>
+            </a:extLst>
+          </p:cNvPr>
+          <p:cNvSpPr>
+            <a:spLocks noGrp="1"/>
+          </p:cNvSpPr>
+          <p:nvPr>
+            <p:ph type="title"/>
+          </p:nvPr>
+        </p:nvSpPr>
+        <p:spPr/>
+        <p:txBody>
+          <a:bodyPr/>
+          <a:lstStyle/>
+          <a:p>
+            <a:r>
+              <a:rPr lang="en-US" dirty="0"/>
+              <a:t>Last week</a:t>
+            </a:r>
+            <a:endParaRPr lang="en-BE" dirty="0"/>
+          </a:p>
+        </p:txBody>
+      </p:sp>
+      <p:sp>
+        <p:nvSpPr>
+          <p:cNvPr id="3" name="Content Placeholder 2">
+            <a:extLst>
+              <a:ext uri="{FF2B5EF4-FFF2-40B4-BE49-F238E27FC236}">
+                <a16:creationId xmlns:a16="http://schemas.microsoft.com/office/drawing/2014/main" id="{B17A1733-469E-21D6-C6B4-5C7ECA654853}"/>
+              </a:ext>
+            </a:extLst>
+          </p:cNvPr>
+          <p:cNvSpPr>
+            <a:spLocks noGrp="1"/>
+          </p:cNvSpPr>
+          <p:nvPr>
+            <p:ph idx="1"/>
+          </p:nvPr>
+        </p:nvSpPr>
+        <p:spPr/>
+        <p:txBody>
+          <a:bodyPr/>
+          <a:lstStyle/>
+          <a:p>
+            <a:r>
+              <a:rPr lang="en-US" dirty="0"/>
+              <a:t>Just copy paste the next slide (“Today”) from previous </a:t>
+            </a:r>
+          </a:p>
+          <a:p>
+            <a:r>
+              <a:rPr lang="en-US" dirty="0"/>
+              <a:t>The idea is to get them in the mindset before introducing new </a:t>
+            </a:r>
+            <a:r>
+              <a:rPr lang="en-US" dirty="0" err="1"/>
+              <a:t>stuf</a:t>
+            </a:r>
+            <a:endParaRPr lang="en-US" dirty="0"/>
+          </a:p>
+        </p:txBody>
+      </p:sp>
+    </p:spTree>
+    <p:extLst>
+      <p:ext uri="{BB962C8B-B14F-4D97-AF65-F5344CB8AC3E}">
+        <p14:creationId xmlns:p14="http://schemas.microsoft.com/office/powerpoint/2010/main" val="1181438857"/>
+      </p:ext>
+    </p:extLst>
+  </p:cSld>
+  <p:clrMapOvr>
+    <a:masterClrMapping/>
+  </p:clrMapOvr>
+</p:sld>
+</file>
+
+<file path=ppt/slides/slide4.xml><?xml version="1.0" encoding="utf-8"?>
+<p:sld xmlns:a="http://schemas.openxmlformats.org/drawingml/2006/main" xmlns:r="http://schemas.openxmlformats.org/officeDocument/2006/relationships" xmlns:p="http://schemas.openxmlformats.org/presentationml/2006/main">
+  <p:cSld>
+    <p:spTree>
+      <p:nvGrpSpPr>
+        <p:cNvPr id="1" name=""/>
+        <p:cNvGrpSpPr/>
+        <p:nvPr/>
+      </p:nvGrpSpPr>
+      <p:grpSpPr>
+        <a:xfrm>
+          <a:off x="0" y="0"/>
+          <a:ext cx="0" cy="0"/>
+          <a:chOff x="0" y="0"/>
+          <a:chExt cx="0" cy="0"/>
+        </a:xfrm>
+      </p:grpSpPr>
+      <p:sp>
+        <p:nvSpPr>
+          <p:cNvPr id="2" name="Title 1">
+            <a:extLst>
+              <a:ext uri="{FF2B5EF4-FFF2-40B4-BE49-F238E27FC236}">
+                <a16:creationId xmlns:a16="http://schemas.microsoft.com/office/drawing/2014/main" id="{426F45EE-DB81-B555-CFAB-6C2DD0591B28}"/>
+              </a:ext>
+            </a:extLst>
+          </p:cNvPr>
+          <p:cNvSpPr>
+            <a:spLocks noGrp="1"/>
+          </p:cNvSpPr>
+          <p:nvPr>
+            <p:ph type="title"/>
+          </p:nvPr>
+        </p:nvSpPr>
+        <p:spPr/>
+        <p:txBody>
+          <a:bodyPr/>
+          <a:lstStyle/>
+          <a:p>
+            <a:r>
+              <a:rPr lang="en-US" dirty="0"/>
+              <a:t>This week</a:t>
+            </a:r>
+            <a:endParaRPr lang="en-BE" dirty="0"/>
+          </a:p>
+        </p:txBody>
+      </p:sp>
+      <p:sp>
+        <p:nvSpPr>
+          <p:cNvPr id="3" name="Content Placeholder 2">
+            <a:extLst>
+              <a:ext uri="{FF2B5EF4-FFF2-40B4-BE49-F238E27FC236}">
+                <a16:creationId xmlns:a16="http://schemas.microsoft.com/office/drawing/2014/main" id="{1F547C97-6546-3078-0477-1EEBF1E0F62C}"/>
+              </a:ext>
+            </a:extLst>
+          </p:cNvPr>
+          <p:cNvSpPr>
+            <a:spLocks noGrp="1"/>
+          </p:cNvSpPr>
+          <p:nvPr>
+            <p:ph idx="1"/>
+          </p:nvPr>
+        </p:nvSpPr>
+        <p:spPr/>
+        <p:txBody>
+          <a:bodyPr/>
+          <a:lstStyle/>
+          <a:p>
+            <a:r>
+              <a:rPr lang="en-US" dirty="0"/>
+              <a:t>Enumerate everything you will explain</a:t>
+            </a:r>
+          </a:p>
+          <a:p>
+            <a:r>
+              <a:rPr lang="en-US" dirty="0"/>
+              <a:t>Put a “carrot”. </a:t>
+            </a:r>
+            <a:r>
+              <a:rPr lang="en-US" dirty="0" err="1"/>
+              <a:t>Eg</a:t>
+            </a:r>
+            <a:r>
+              <a:rPr lang="en-US" dirty="0"/>
+              <a:t> “At some point, there will be a twist”. This will keep them alert looking for the twist</a:t>
+            </a:r>
+          </a:p>
+          <a:p>
+            <a:r>
+              <a:rPr lang="en-US" dirty="0"/>
+              <a:t>End with the conclusion (“accessibility is important, and not an </a:t>
+            </a:r>
+            <a:r>
+              <a:rPr lang="en-US" dirty="0" err="1"/>
+              <a:t>afterthough</a:t>
+            </a:r>
+            <a:r>
+              <a:rPr lang="en-US" dirty="0"/>
+              <a:t>”)</a:t>
+            </a:r>
+            <a:endParaRPr lang="en-BE" dirty="0"/>
+          </a:p>
+        </p:txBody>
+      </p:sp>
+    </p:spTree>
+    <p:extLst>
+      <p:ext uri="{BB962C8B-B14F-4D97-AF65-F5344CB8AC3E}">
+        <p14:creationId xmlns:p14="http://schemas.microsoft.com/office/powerpoint/2010/main" val="71916978"/>
+      </p:ext>
+    </p:extLst>
+  </p:cSld>
+  <p:clrMapOvr>
+    <a:masterClrMapping/>
+  </p:clrMapOvr>
+</p:sld>
+</file>
+
+<file path=ppt/slides/slide5.xml><?xml version="1.0" encoding="utf-8"?>
+<p:sld xmlns:a="http://schemas.openxmlformats.org/drawingml/2006/main" xmlns:r="http://schemas.openxmlformats.org/officeDocument/2006/relationships" xmlns:p="http://schemas.openxmlformats.org/presentationml/2006/main">
+  <p:cSld>
+    <p:spTree>
+      <p:nvGrpSpPr>
+        <p:cNvPr id="1" name=""/>
+        <p:cNvGrpSpPr/>
+        <p:nvPr/>
+      </p:nvGrpSpPr>
+      <p:grpSpPr>
+        <a:xfrm>
+          <a:off x="0" y="0"/>
+          <a:ext cx="0" cy="0"/>
+          <a:chOff x="0" y="0"/>
+          <a:chExt cx="0" cy="0"/>
+        </a:xfrm>
+      </p:grpSpPr>
+      <p:sp>
+        <p:nvSpPr>
+          <p:cNvPr id="2" name="Title 1">
+            <a:extLst>
+              <a:ext uri="{FF2B5EF4-FFF2-40B4-BE49-F238E27FC236}">
+                <a16:creationId xmlns:a16="http://schemas.microsoft.com/office/drawing/2014/main" id="{793F237C-C6E9-2998-C8A2-8312F94D6261}"/>
+              </a:ext>
+            </a:extLst>
+          </p:cNvPr>
+          <p:cNvSpPr>
+            <a:spLocks noGrp="1"/>
+          </p:cNvSpPr>
+          <p:nvPr>
+            <p:ph type="title"/>
+          </p:nvPr>
+        </p:nvSpPr>
+        <p:spPr/>
+        <p:txBody>
+          <a:bodyPr/>
+          <a:lstStyle/>
+          <a:p>
+            <a:r>
+              <a:rPr lang="en-US" dirty="0"/>
+              <a:t>Course planning : context</a:t>
+            </a:r>
+            <a:endParaRPr lang="en-BE" dirty="0"/>
+          </a:p>
+        </p:txBody>
+      </p:sp>
+      <p:sp>
+        <p:nvSpPr>
+          <p:cNvPr id="3" name="Content Placeholder 2">
+            <a:extLst>
+              <a:ext uri="{FF2B5EF4-FFF2-40B4-BE49-F238E27FC236}">
+                <a16:creationId xmlns:a16="http://schemas.microsoft.com/office/drawing/2014/main" id="{82698281-CB6A-C272-1323-4DCEDCFF5255}"/>
+              </a:ext>
+            </a:extLst>
+          </p:cNvPr>
+          <p:cNvSpPr>
+            <a:spLocks noGrp="1"/>
+          </p:cNvSpPr>
+          <p:nvPr>
+            <p:ph idx="1"/>
+          </p:nvPr>
+        </p:nvSpPr>
+        <p:spPr/>
+        <p:txBody>
+          <a:bodyPr/>
+          <a:lstStyle/>
+          <a:p>
+            <a:r>
+              <a:rPr lang="en-US" dirty="0"/>
+              <a:t>A list of all the weeks with topics, big arrow at where we’re at</a:t>
+            </a:r>
+          </a:p>
+        </p:txBody>
+      </p:sp>
+    </p:spTree>
+    <p:extLst>
+      <p:ext uri="{BB962C8B-B14F-4D97-AF65-F5344CB8AC3E}">
+        <p14:creationId xmlns:p14="http://schemas.microsoft.com/office/powerpoint/2010/main" val="3089239369"/>
+      </p:ext>
+    </p:extLst>
+  </p:cSld>
+  <p:clrMapOvr>
+    <a:masterClrMapping/>
+  </p:clrMapOvr>
+</p:sld>
+</file>
+
+<file path=ppt/slides/slide6.xml><?xml version="1.0" encoding="utf-8"?>
+<p:sld xmlns:a="http://schemas.openxmlformats.org/drawingml/2006/main" xmlns:r="http://schemas.openxmlformats.org/officeDocument/2006/relationships" xmlns:p="http://schemas.openxmlformats.org/presentationml/2006/main">
+  <p:cSld>
+    <p:spTree>
+      <p:nvGrpSpPr>
+        <p:cNvPr id="1" name=""/>
+        <p:cNvGrpSpPr/>
+        <p:nvPr/>
+      </p:nvGrpSpPr>
+      <p:grpSpPr>
+        <a:xfrm>
+          <a:off x="0" y="0"/>
+          <a:ext cx="0" cy="0"/>
+          <a:chOff x="0" y="0"/>
+          <a:chExt cx="0" cy="0"/>
+        </a:xfrm>
+      </p:grpSpPr>
+      <p:sp>
+        <p:nvSpPr>
+          <p:cNvPr id="2" name="Title 1">
+            <a:extLst>
+              <a:ext uri="{FF2B5EF4-FFF2-40B4-BE49-F238E27FC236}">
+                <a16:creationId xmlns:a16="http://schemas.microsoft.com/office/drawing/2014/main" id="{C38DDC08-F921-8F07-31DD-804A0985BF13}"/>
+              </a:ext>
+            </a:extLst>
+          </p:cNvPr>
+          <p:cNvSpPr>
+            <a:spLocks noGrp="1"/>
+          </p:cNvSpPr>
+          <p:nvPr>
+            <p:ph type="title"/>
+          </p:nvPr>
+        </p:nvSpPr>
+        <p:spPr/>
+        <p:txBody>
+          <a:bodyPr/>
+          <a:lstStyle/>
+          <a:p>
+            <a:r>
+              <a:rPr lang="en-US" dirty="0"/>
+              <a:t>Traffic lights</a:t>
+            </a:r>
+            <a:endParaRPr lang="en-BE" dirty="0"/>
+          </a:p>
+        </p:txBody>
+      </p:sp>
+      <p:sp>
+        <p:nvSpPr>
+          <p:cNvPr id="3" name="Content Placeholder 2">
+            <a:extLst>
+              <a:ext uri="{FF2B5EF4-FFF2-40B4-BE49-F238E27FC236}">
+                <a16:creationId xmlns:a16="http://schemas.microsoft.com/office/drawing/2014/main" id="{6C42BD6D-E344-FF4A-1E7F-396647508CA1}"/>
+              </a:ext>
+            </a:extLst>
+          </p:cNvPr>
+          <p:cNvSpPr>
+            <a:spLocks noGrp="1"/>
+          </p:cNvSpPr>
+          <p:nvPr>
+            <p:ph idx="1"/>
+          </p:nvPr>
+        </p:nvSpPr>
+        <p:spPr/>
+        <p:txBody>
+          <a:bodyPr/>
+          <a:lstStyle/>
+          <a:p>
+            <a:r>
+              <a:rPr lang="en-US" dirty="0"/>
+              <a:t>Green : if you’re at this point of your project this week, you’re doing fine</a:t>
+            </a:r>
+          </a:p>
+          <a:p>
+            <a:r>
+              <a:rPr lang="en-US" dirty="0"/>
+              <a:t>Orange : if you’re at this point of your project this week, you don’t have an immediate problem, but you’re in the danger zone</a:t>
+            </a:r>
+          </a:p>
+          <a:p>
+            <a:r>
+              <a:rPr lang="en-US" dirty="0"/>
+              <a:t>Red : if you’re at this point, or not even at this point, you have a really big problem. Contact me.</a:t>
+            </a:r>
+            <a:endParaRPr lang="en-BE" dirty="0"/>
+          </a:p>
+        </p:txBody>
+      </p:sp>
+    </p:spTree>
+    <p:extLst>
+      <p:ext uri="{BB962C8B-B14F-4D97-AF65-F5344CB8AC3E}">
+        <p14:creationId xmlns:p14="http://schemas.microsoft.com/office/powerpoint/2010/main" val="1896418787"/>
+      </p:ext>
+    </p:extLst>
+  </p:cSld>
+  <p:clrMapOvr>
+    <a:masterClrMapping/>
+  </p:clrMapOvr>
+</p:sld>
+</file>
+
+<file path=ppt/slides/slide7.xml><?xml version="1.0" encoding="utf-8"?>
+<p:sld xmlns:a="http://schemas.openxmlformats.org/drawingml/2006/main" xmlns:r="http://schemas.openxmlformats.org/officeDocument/2006/relationships" xmlns:p="http://schemas.openxmlformats.org/presentationml/2006/main">
+  <p:cSld>
+    <p:spTree>
+      <p:nvGrpSpPr>
+        <p:cNvPr id="1" name=""/>
+        <p:cNvGrpSpPr/>
+        <p:nvPr/>
+      </p:nvGrpSpPr>
+      <p:grpSpPr>
+        <a:xfrm>
+          <a:off x="0" y="0"/>
+          <a:ext cx="0" cy="0"/>
+          <a:chOff x="0" y="0"/>
+          <a:chExt cx="0" cy="0"/>
+        </a:xfrm>
+      </p:grpSpPr>
+      <p:sp>
+        <p:nvSpPr>
+          <p:cNvPr id="2" name="Title 1">
+            <a:extLst>
+              <a:ext uri="{FF2B5EF4-FFF2-40B4-BE49-F238E27FC236}">
+                <a16:creationId xmlns:a16="http://schemas.microsoft.com/office/drawing/2014/main" id="{82DC8CF7-4522-2BFF-9567-0434E728F30F}"/>
+              </a:ext>
+            </a:extLst>
+          </p:cNvPr>
+          <p:cNvSpPr>
+            <a:spLocks noGrp="1"/>
+          </p:cNvSpPr>
+          <p:nvPr>
+            <p:ph type="title"/>
+          </p:nvPr>
+        </p:nvSpPr>
+        <p:spPr/>
+        <p:txBody>
+          <a:bodyPr/>
+          <a:lstStyle/>
+          <a:p>
+            <a:r>
+              <a:rPr lang="en-US" dirty="0"/>
+              <a:t>Content</a:t>
+            </a:r>
+            <a:endParaRPr lang="en-BE" dirty="0"/>
+          </a:p>
+        </p:txBody>
+      </p:sp>
+      <p:sp>
+        <p:nvSpPr>
+          <p:cNvPr id="3" name="Content Placeholder 2">
+            <a:extLst>
+              <a:ext uri="{FF2B5EF4-FFF2-40B4-BE49-F238E27FC236}">
+                <a16:creationId xmlns:a16="http://schemas.microsoft.com/office/drawing/2014/main" id="{335DC72E-EBF7-073F-0553-BEA39344BD07}"/>
+              </a:ext>
+            </a:extLst>
+          </p:cNvPr>
+          <p:cNvSpPr>
+            <a:spLocks noGrp="1"/>
+          </p:cNvSpPr>
+          <p:nvPr>
+            <p:ph idx="1"/>
+          </p:nvPr>
+        </p:nvSpPr>
+        <p:spPr/>
+        <p:txBody>
+          <a:bodyPr/>
+          <a:lstStyle/>
+          <a:p>
+            <a:r>
+              <a:rPr lang="en-US" dirty="0"/>
+              <a:t>Your content here</a:t>
+            </a:r>
+            <a:endParaRPr lang="en-BE" dirty="0"/>
+          </a:p>
+        </p:txBody>
+      </p:sp>
+    </p:spTree>
+    <p:extLst>
+      <p:ext uri="{BB962C8B-B14F-4D97-AF65-F5344CB8AC3E}">
+        <p14:creationId xmlns:p14="http://schemas.microsoft.com/office/powerpoint/2010/main" val="1965686554"/>
+      </p:ext>
+    </p:extLst>
+  </p:cSld>
+  <p:clrMapOvr>
+    <a:masterClrMapping/>
+  </p:clrMapOvr>
+</p:sld>
+</file>
+
+<file path=ppt/slides/slide8.xml><?xml version="1.0" encoding="utf-8"?>
+<p:sld xmlns:a="http://schemas.openxmlformats.org/drawingml/2006/main" xmlns:r="http://schemas.openxmlformats.org/officeDocument/2006/relationships" xmlns:p="http://schemas.openxmlformats.org/presentationml/2006/main">
+  <p:cSld>
+    <p:spTree>
+      <p:nvGrpSpPr>
+        <p:cNvPr id="1" name=""/>
+        <p:cNvGrpSpPr/>
+        <p:nvPr/>
+      </p:nvGrpSpPr>
+      <p:grpSpPr>
+        <a:xfrm>
+          <a:off x="0" y="0"/>
+          <a:ext cx="0" cy="0"/>
+          <a:chOff x="0" y="0"/>
+          <a:chExt cx="0" cy="0"/>
+        </a:xfrm>
+      </p:grpSpPr>
+      <p:sp>
+        <p:nvSpPr>
+          <p:cNvPr id="2" name="Title 1">
+            <a:extLst>
+              <a:ext uri="{FF2B5EF4-FFF2-40B4-BE49-F238E27FC236}">
+                <a16:creationId xmlns:a16="http://schemas.microsoft.com/office/drawing/2014/main" id="{062E1B29-2451-9A56-081C-68CD969CD414}"/>
+              </a:ext>
+            </a:extLst>
+          </p:cNvPr>
+          <p:cNvSpPr>
+            <a:spLocks noGrp="1"/>
+          </p:cNvSpPr>
+          <p:nvPr>
+            <p:ph type="title"/>
+          </p:nvPr>
+        </p:nvSpPr>
+        <p:spPr/>
+        <p:txBody>
+          <a:bodyPr/>
+          <a:lstStyle/>
+          <a:p>
+            <a:r>
+              <a:rPr lang="en-US" dirty="0"/>
+              <a:t>Next week</a:t>
+            </a:r>
+            <a:endParaRPr lang="en-BE" dirty="0"/>
+          </a:p>
+        </p:txBody>
+      </p:sp>
+      <p:sp>
+        <p:nvSpPr>
+          <p:cNvPr id="3" name="Content Placeholder 2">
+            <a:extLst>
+              <a:ext uri="{FF2B5EF4-FFF2-40B4-BE49-F238E27FC236}">
+                <a16:creationId xmlns:a16="http://schemas.microsoft.com/office/drawing/2014/main" id="{455008CE-861D-A232-5569-26CEEA5A63C4}"/>
+              </a:ext>
+            </a:extLst>
+          </p:cNvPr>
+          <p:cNvSpPr>
+            <a:spLocks noGrp="1"/>
+          </p:cNvSpPr>
+          <p:nvPr>
+            <p:ph idx="1"/>
+          </p:nvPr>
+        </p:nvSpPr>
+        <p:spPr/>
+        <p:txBody>
+          <a:bodyPr/>
+          <a:lstStyle/>
+          <a:p>
+            <a:r>
+              <a:rPr lang="en-US" dirty="0"/>
+              <a:t>Ideally the slide “today” of next week’s intro slides, but can be more vague. Try to make it enticing</a:t>
+            </a:r>
+            <a:endParaRPr lang="en-BE" dirty="0"/>
+          </a:p>
+        </p:txBody>
+      </p:sp>
+    </p:spTree>
+    <p:extLst>
+      <p:ext uri="{BB962C8B-B14F-4D97-AF65-F5344CB8AC3E}">
+        <p14:creationId xmlns:p14="http://schemas.microsoft.com/office/powerpoint/2010/main" val="4252566588"/>
       </p:ext>
     </p:extLst>
   </p:cSld>

</xml_diff>